<commit_message>
Added one problem I encountered to the presentation
Changed some of the module descriptions to better fit their purpose.
</commit_message>
<xml_diff>
--- a/מצגת פרוייקט FTP.pptx
+++ b/מצגת פרוייקט FTP.pptx
@@ -110,7 +110,7 @@
   </p:defaultTextStyle>
   <p:extLst>
     <p:ext uri="{EFAFB233-063F-42B5-8137-9DF3F51BA10A}">
-      <p15:sldGuideLst xmlns:p15="http://schemas.microsoft.com/office/powerpoint/2012/main"/>
+      <p15:sldGuideLst xmlns:p15="http://schemas.microsoft.com/office/powerpoint/2012/main" xmlns=""/>
     </p:ext>
   </p:extLst>
 </p:presentation>
@@ -838,7 +838,8 @@
           <a:p>
             <a:fld id="{7A2A5D9F-A28E-4F47-B87A-E515AA88734E}" type="datetimeFigureOut">
               <a:rPr lang="he-IL" smtClean="0"/>
-              <a:t>כ"ו/אדר/תשע"ח</a:t>
+              <a:pPr/>
+              <a:t>כ"ז/אדר/תשע"ח</a:t>
             </a:fld>
             <a:endParaRPr lang="he-IL"/>
           </a:p>
@@ -880,6 +881,7 @@
           <a:p>
             <a:fld id="{F30826BB-3476-4346-BDDB-A035EB3DEE5C}" type="slidenum">
               <a:rPr lang="he-IL" smtClean="0"/>
+              <a:pPr/>
               <a:t>‹#›</a:t>
             </a:fld>
             <a:endParaRPr lang="he-IL"/>
@@ -889,7 +891,7 @@
     </p:spTree>
     <p:extLst>
       <p:ext uri="{BB962C8B-B14F-4D97-AF65-F5344CB8AC3E}">
-        <p14:creationId xmlns:p14="http://schemas.microsoft.com/office/powerpoint/2010/main" val="618220654"/>
+        <p14:creationId xmlns:p14="http://schemas.microsoft.com/office/powerpoint/2010/main" xmlns="" val="618220654"/>
       </p:ext>
     </p:extLst>
   </p:cSld>
@@ -1089,7 +1091,8 @@
           <a:p>
             <a:fld id="{7A2A5D9F-A28E-4F47-B87A-E515AA88734E}" type="datetimeFigureOut">
               <a:rPr lang="he-IL" smtClean="0"/>
-              <a:t>כ"ו/אדר/תשע"ח</a:t>
+              <a:pPr/>
+              <a:t>כ"ז/אדר/תשע"ח</a:t>
             </a:fld>
             <a:endParaRPr lang="he-IL"/>
           </a:p>
@@ -1131,6 +1134,7 @@
           <a:p>
             <a:fld id="{F30826BB-3476-4346-BDDB-A035EB3DEE5C}" type="slidenum">
               <a:rPr lang="he-IL" smtClean="0"/>
+              <a:pPr/>
               <a:t>‹#›</a:t>
             </a:fld>
             <a:endParaRPr lang="he-IL"/>
@@ -1140,7 +1144,7 @@
     </p:spTree>
     <p:extLst>
       <p:ext uri="{BB962C8B-B14F-4D97-AF65-F5344CB8AC3E}">
-        <p14:creationId xmlns:p14="http://schemas.microsoft.com/office/powerpoint/2010/main" val="3167133964"/>
+        <p14:creationId xmlns:p14="http://schemas.microsoft.com/office/powerpoint/2010/main" xmlns="" val="3167133964"/>
       </p:ext>
     </p:extLst>
   </p:cSld>
@@ -1403,7 +1407,8 @@
           <a:p>
             <a:fld id="{7A2A5D9F-A28E-4F47-B87A-E515AA88734E}" type="datetimeFigureOut">
               <a:rPr lang="he-IL" smtClean="0"/>
-              <a:t>כ"ו/אדר/תשע"ח</a:t>
+              <a:pPr/>
+              <a:t>כ"ז/אדר/תשע"ח</a:t>
             </a:fld>
             <a:endParaRPr lang="he-IL"/>
           </a:p>
@@ -1445,6 +1450,7 @@
           <a:p>
             <a:fld id="{F30826BB-3476-4346-BDDB-A035EB3DEE5C}" type="slidenum">
               <a:rPr lang="he-IL" smtClean="0"/>
+              <a:pPr/>
               <a:t>‹#›</a:t>
             </a:fld>
             <a:endParaRPr lang="he-IL"/>
@@ -1544,7 +1550,7 @@
     </p:spTree>
     <p:extLst>
       <p:ext uri="{BB962C8B-B14F-4D97-AF65-F5344CB8AC3E}">
-        <p14:creationId xmlns:p14="http://schemas.microsoft.com/office/powerpoint/2010/main" val="2626388392"/>
+        <p14:creationId xmlns:p14="http://schemas.microsoft.com/office/powerpoint/2010/main" xmlns="" val="2626388392"/>
       </p:ext>
     </p:extLst>
   </p:cSld>
@@ -1744,7 +1750,8 @@
           <a:p>
             <a:fld id="{7A2A5D9F-A28E-4F47-B87A-E515AA88734E}" type="datetimeFigureOut">
               <a:rPr lang="he-IL" smtClean="0"/>
-              <a:t>כ"ו/אדר/תשע"ח</a:t>
+              <a:pPr/>
+              <a:t>כ"ז/אדר/תשע"ח</a:t>
             </a:fld>
             <a:endParaRPr lang="he-IL"/>
           </a:p>
@@ -1786,6 +1793,7 @@
           <a:p>
             <a:fld id="{F30826BB-3476-4346-BDDB-A035EB3DEE5C}" type="slidenum">
               <a:rPr lang="he-IL" smtClean="0"/>
+              <a:pPr/>
               <a:t>‹#›</a:t>
             </a:fld>
             <a:endParaRPr lang="he-IL"/>
@@ -1795,7 +1803,7 @@
     </p:spTree>
     <p:extLst>
       <p:ext uri="{BB962C8B-B14F-4D97-AF65-F5344CB8AC3E}">
-        <p14:creationId xmlns:p14="http://schemas.microsoft.com/office/powerpoint/2010/main" val="2320328026"/>
+        <p14:creationId xmlns:p14="http://schemas.microsoft.com/office/powerpoint/2010/main" xmlns="" val="2320328026"/>
       </p:ext>
     </p:extLst>
   </p:cSld>
@@ -2058,7 +2066,8 @@
           <a:p>
             <a:fld id="{7A2A5D9F-A28E-4F47-B87A-E515AA88734E}" type="datetimeFigureOut">
               <a:rPr lang="he-IL" smtClean="0"/>
-              <a:t>כ"ו/אדר/תשע"ח</a:t>
+              <a:pPr/>
+              <a:t>כ"ז/אדר/תשע"ח</a:t>
             </a:fld>
             <a:endParaRPr lang="he-IL"/>
           </a:p>
@@ -2100,6 +2109,7 @@
           <a:p>
             <a:fld id="{F30826BB-3476-4346-BDDB-A035EB3DEE5C}" type="slidenum">
               <a:rPr lang="he-IL" smtClean="0"/>
+              <a:pPr/>
               <a:t>‹#›</a:t>
             </a:fld>
             <a:endParaRPr lang="he-IL"/>
@@ -2191,7 +2201,7 @@
     </p:spTree>
     <p:extLst>
       <p:ext uri="{BB962C8B-B14F-4D97-AF65-F5344CB8AC3E}">
-        <p14:creationId xmlns:p14="http://schemas.microsoft.com/office/powerpoint/2010/main" val="518596355"/>
+        <p14:creationId xmlns:p14="http://schemas.microsoft.com/office/powerpoint/2010/main" xmlns="" val="518596355"/>
       </p:ext>
     </p:extLst>
   </p:cSld>
@@ -2451,7 +2461,8 @@
           <a:p>
             <a:fld id="{7A2A5D9F-A28E-4F47-B87A-E515AA88734E}" type="datetimeFigureOut">
               <a:rPr lang="he-IL" smtClean="0"/>
-              <a:t>כ"ו/אדר/תשע"ח</a:t>
+              <a:pPr/>
+              <a:t>כ"ז/אדר/תשע"ח</a:t>
             </a:fld>
             <a:endParaRPr lang="he-IL"/>
           </a:p>
@@ -2493,6 +2504,7 @@
           <a:p>
             <a:fld id="{F30826BB-3476-4346-BDDB-A035EB3DEE5C}" type="slidenum">
               <a:rPr lang="he-IL" smtClean="0"/>
+              <a:pPr/>
               <a:t>‹#›</a:t>
             </a:fld>
             <a:endParaRPr lang="he-IL"/>
@@ -2502,7 +2514,7 @@
     </p:spTree>
     <p:extLst>
       <p:ext uri="{BB962C8B-B14F-4D97-AF65-F5344CB8AC3E}">
-        <p14:creationId xmlns:p14="http://schemas.microsoft.com/office/powerpoint/2010/main" val="346253658"/>
+        <p14:creationId xmlns:p14="http://schemas.microsoft.com/office/powerpoint/2010/main" xmlns="" val="346253658"/>
       </p:ext>
     </p:extLst>
   </p:cSld>
@@ -2621,7 +2633,8 @@
           <a:p>
             <a:fld id="{7A2A5D9F-A28E-4F47-B87A-E515AA88734E}" type="datetimeFigureOut">
               <a:rPr lang="he-IL" smtClean="0"/>
-              <a:t>כ"ו/אדר/תשע"ח</a:t>
+              <a:pPr/>
+              <a:t>כ"ז/אדר/תשע"ח</a:t>
             </a:fld>
             <a:endParaRPr lang="he-IL"/>
           </a:p>
@@ -2663,6 +2676,7 @@
           <a:p>
             <a:fld id="{F30826BB-3476-4346-BDDB-A035EB3DEE5C}" type="slidenum">
               <a:rPr lang="he-IL" smtClean="0"/>
+              <a:pPr/>
               <a:t>‹#›</a:t>
             </a:fld>
             <a:endParaRPr lang="he-IL"/>
@@ -2672,7 +2686,7 @@
     </p:spTree>
     <p:extLst>
       <p:ext uri="{BB962C8B-B14F-4D97-AF65-F5344CB8AC3E}">
-        <p14:creationId xmlns:p14="http://schemas.microsoft.com/office/powerpoint/2010/main" val="4287052525"/>
+        <p14:creationId xmlns:p14="http://schemas.microsoft.com/office/powerpoint/2010/main" xmlns="" val="4287052525"/>
       </p:ext>
     </p:extLst>
   </p:cSld>
@@ -2801,7 +2815,8 @@
           <a:p>
             <a:fld id="{7A2A5D9F-A28E-4F47-B87A-E515AA88734E}" type="datetimeFigureOut">
               <a:rPr lang="he-IL" smtClean="0"/>
-              <a:t>כ"ו/אדר/תשע"ח</a:t>
+              <a:pPr/>
+              <a:t>כ"ז/אדר/תשע"ח</a:t>
             </a:fld>
             <a:endParaRPr lang="he-IL"/>
           </a:p>
@@ -2843,6 +2858,7 @@
           <a:p>
             <a:fld id="{F30826BB-3476-4346-BDDB-A035EB3DEE5C}" type="slidenum">
               <a:rPr lang="he-IL" smtClean="0"/>
+              <a:pPr/>
               <a:t>‹#›</a:t>
             </a:fld>
             <a:endParaRPr lang="he-IL"/>
@@ -2852,7 +2868,7 @@
     </p:spTree>
     <p:extLst>
       <p:ext uri="{BB962C8B-B14F-4D97-AF65-F5344CB8AC3E}">
-        <p14:creationId xmlns:p14="http://schemas.microsoft.com/office/powerpoint/2010/main" val="1965993728"/>
+        <p14:creationId xmlns:p14="http://schemas.microsoft.com/office/powerpoint/2010/main" xmlns="" val="1965993728"/>
       </p:ext>
     </p:extLst>
   </p:cSld>
@@ -2977,7 +2993,8 @@
           <a:p>
             <a:fld id="{7A2A5D9F-A28E-4F47-B87A-E515AA88734E}" type="datetimeFigureOut">
               <a:rPr lang="he-IL" smtClean="0"/>
-              <a:t>כ"ו/אדר/תשע"ח</a:t>
+              <a:pPr/>
+              <a:t>כ"ז/אדר/תשע"ח</a:t>
             </a:fld>
             <a:endParaRPr lang="he-IL"/>
           </a:p>
@@ -3019,6 +3036,7 @@
           <a:p>
             <a:fld id="{F30826BB-3476-4346-BDDB-A035EB3DEE5C}" type="slidenum">
               <a:rPr lang="he-IL" smtClean="0"/>
+              <a:pPr/>
               <a:t>‹#›</a:t>
             </a:fld>
             <a:endParaRPr lang="he-IL"/>
@@ -3028,7 +3046,7 @@
     </p:spTree>
     <p:extLst>
       <p:ext uri="{BB962C8B-B14F-4D97-AF65-F5344CB8AC3E}">
-        <p14:creationId xmlns:p14="http://schemas.microsoft.com/office/powerpoint/2010/main" val="3927170831"/>
+        <p14:creationId xmlns:p14="http://schemas.microsoft.com/office/powerpoint/2010/main" xmlns="" val="3927170831"/>
       </p:ext>
     </p:extLst>
   </p:cSld>
@@ -3224,7 +3242,8 @@
           <a:p>
             <a:fld id="{7A2A5D9F-A28E-4F47-B87A-E515AA88734E}" type="datetimeFigureOut">
               <a:rPr lang="he-IL" smtClean="0"/>
-              <a:t>כ"ו/אדר/תשע"ח</a:t>
+              <a:pPr/>
+              <a:t>כ"ז/אדר/תשע"ח</a:t>
             </a:fld>
             <a:endParaRPr lang="he-IL"/>
           </a:p>
@@ -3266,6 +3285,7 @@
           <a:p>
             <a:fld id="{F30826BB-3476-4346-BDDB-A035EB3DEE5C}" type="slidenum">
               <a:rPr lang="he-IL" smtClean="0"/>
+              <a:pPr/>
               <a:t>‹#›</a:t>
             </a:fld>
             <a:endParaRPr lang="he-IL"/>
@@ -3275,7 +3295,7 @@
     </p:spTree>
     <p:extLst>
       <p:ext uri="{BB962C8B-B14F-4D97-AF65-F5344CB8AC3E}">
-        <p14:creationId xmlns:p14="http://schemas.microsoft.com/office/powerpoint/2010/main" val="2137871721"/>
+        <p14:creationId xmlns:p14="http://schemas.microsoft.com/office/powerpoint/2010/main" xmlns="" val="2137871721"/>
       </p:ext>
     </p:extLst>
   </p:cSld>
@@ -3456,7 +3476,8 @@
           <a:p>
             <a:fld id="{7A2A5D9F-A28E-4F47-B87A-E515AA88734E}" type="datetimeFigureOut">
               <a:rPr lang="he-IL" smtClean="0"/>
-              <a:t>כ"ו/אדר/תשע"ח</a:t>
+              <a:pPr/>
+              <a:t>כ"ז/אדר/תשע"ח</a:t>
             </a:fld>
             <a:endParaRPr lang="he-IL"/>
           </a:p>
@@ -3498,6 +3519,7 @@
           <a:p>
             <a:fld id="{F30826BB-3476-4346-BDDB-A035EB3DEE5C}" type="slidenum">
               <a:rPr lang="he-IL" smtClean="0"/>
+              <a:pPr/>
               <a:t>‹#›</a:t>
             </a:fld>
             <a:endParaRPr lang="he-IL"/>
@@ -3507,7 +3529,7 @@
     </p:spTree>
     <p:extLst>
       <p:ext uri="{BB962C8B-B14F-4D97-AF65-F5344CB8AC3E}">
-        <p14:creationId xmlns:p14="http://schemas.microsoft.com/office/powerpoint/2010/main" val="1382156666"/>
+        <p14:creationId xmlns:p14="http://schemas.microsoft.com/office/powerpoint/2010/main" xmlns="" val="1382156666"/>
       </p:ext>
     </p:extLst>
   </p:cSld>
@@ -3830,7 +3852,8 @@
           <a:p>
             <a:fld id="{7A2A5D9F-A28E-4F47-B87A-E515AA88734E}" type="datetimeFigureOut">
               <a:rPr lang="he-IL" smtClean="0"/>
-              <a:t>כ"ו/אדר/תשע"ח</a:t>
+              <a:pPr/>
+              <a:t>כ"ז/אדר/תשע"ח</a:t>
             </a:fld>
             <a:endParaRPr lang="he-IL"/>
           </a:p>
@@ -3872,6 +3895,7 @@
           <a:p>
             <a:fld id="{F30826BB-3476-4346-BDDB-A035EB3DEE5C}" type="slidenum">
               <a:rPr lang="he-IL" smtClean="0"/>
+              <a:pPr/>
               <a:t>‹#›</a:t>
             </a:fld>
             <a:endParaRPr lang="he-IL"/>
@@ -3881,7 +3905,7 @@
     </p:spTree>
     <p:extLst>
       <p:ext uri="{BB962C8B-B14F-4D97-AF65-F5344CB8AC3E}">
-        <p14:creationId xmlns:p14="http://schemas.microsoft.com/office/powerpoint/2010/main" val="4189209118"/>
+        <p14:creationId xmlns:p14="http://schemas.microsoft.com/office/powerpoint/2010/main" xmlns="" val="4189209118"/>
       </p:ext>
     </p:extLst>
   </p:cSld>
@@ -3953,7 +3977,8 @@
           <a:p>
             <a:fld id="{7A2A5D9F-A28E-4F47-B87A-E515AA88734E}" type="datetimeFigureOut">
               <a:rPr lang="he-IL" smtClean="0"/>
-              <a:t>כ"ו/אדר/תשע"ח</a:t>
+              <a:pPr/>
+              <a:t>כ"ז/אדר/תשע"ח</a:t>
             </a:fld>
             <a:endParaRPr lang="he-IL"/>
           </a:p>
@@ -3995,6 +4020,7 @@
           <a:p>
             <a:fld id="{F30826BB-3476-4346-BDDB-A035EB3DEE5C}" type="slidenum">
               <a:rPr lang="he-IL" smtClean="0"/>
+              <a:pPr/>
               <a:t>‹#›</a:t>
             </a:fld>
             <a:endParaRPr lang="he-IL"/>
@@ -4004,7 +4030,7 @@
     </p:spTree>
     <p:extLst>
       <p:ext uri="{BB962C8B-B14F-4D97-AF65-F5344CB8AC3E}">
-        <p14:creationId xmlns:p14="http://schemas.microsoft.com/office/powerpoint/2010/main" val="2761650093"/>
+        <p14:creationId xmlns:p14="http://schemas.microsoft.com/office/powerpoint/2010/main" xmlns="" val="2761650093"/>
       </p:ext>
     </p:extLst>
   </p:cSld>
@@ -4048,7 +4074,8 @@
           <a:p>
             <a:fld id="{7A2A5D9F-A28E-4F47-B87A-E515AA88734E}" type="datetimeFigureOut">
               <a:rPr lang="he-IL" smtClean="0"/>
-              <a:t>כ"ו/אדר/תשע"ח</a:t>
+              <a:pPr/>
+              <a:t>כ"ז/אדר/תשע"ח</a:t>
             </a:fld>
             <a:endParaRPr lang="he-IL"/>
           </a:p>
@@ -4090,6 +4117,7 @@
           <a:p>
             <a:fld id="{F30826BB-3476-4346-BDDB-A035EB3DEE5C}" type="slidenum">
               <a:rPr lang="he-IL" smtClean="0"/>
+              <a:pPr/>
               <a:t>‹#›</a:t>
             </a:fld>
             <a:endParaRPr lang="he-IL"/>
@@ -4099,7 +4127,7 @@
     </p:spTree>
     <p:extLst>
       <p:ext uri="{BB962C8B-B14F-4D97-AF65-F5344CB8AC3E}">
-        <p14:creationId xmlns:p14="http://schemas.microsoft.com/office/powerpoint/2010/main" val="1476602307"/>
+        <p14:creationId xmlns:p14="http://schemas.microsoft.com/office/powerpoint/2010/main" xmlns="" val="1476602307"/>
       </p:ext>
     </p:extLst>
   </p:cSld>
@@ -4303,7 +4331,8 @@
           <a:p>
             <a:fld id="{7A2A5D9F-A28E-4F47-B87A-E515AA88734E}" type="datetimeFigureOut">
               <a:rPr lang="he-IL" smtClean="0"/>
-              <a:t>כ"ו/אדר/תשע"ח</a:t>
+              <a:pPr/>
+              <a:t>כ"ז/אדר/תשע"ח</a:t>
             </a:fld>
             <a:endParaRPr lang="he-IL"/>
           </a:p>
@@ -4345,6 +4374,7 @@
           <a:p>
             <a:fld id="{F30826BB-3476-4346-BDDB-A035EB3DEE5C}" type="slidenum">
               <a:rPr lang="he-IL" smtClean="0"/>
+              <a:pPr/>
               <a:t>‹#›</a:t>
             </a:fld>
             <a:endParaRPr lang="he-IL"/>
@@ -4354,7 +4384,7 @@
     </p:spTree>
     <p:extLst>
       <p:ext uri="{BB962C8B-B14F-4D97-AF65-F5344CB8AC3E}">
-        <p14:creationId xmlns:p14="http://schemas.microsoft.com/office/powerpoint/2010/main" val="656705328"/>
+        <p14:creationId xmlns:p14="http://schemas.microsoft.com/office/powerpoint/2010/main" xmlns="" val="656705328"/>
       </p:ext>
     </p:extLst>
   </p:cSld>
@@ -4566,7 +4596,8 @@
           <a:p>
             <a:fld id="{7A2A5D9F-A28E-4F47-B87A-E515AA88734E}" type="datetimeFigureOut">
               <a:rPr lang="he-IL" smtClean="0"/>
-              <a:t>כ"ו/אדר/תשע"ח</a:t>
+              <a:pPr/>
+              <a:t>כ"ז/אדר/תשע"ח</a:t>
             </a:fld>
             <a:endParaRPr lang="he-IL"/>
           </a:p>
@@ -4608,6 +4639,7 @@
           <a:p>
             <a:fld id="{F30826BB-3476-4346-BDDB-A035EB3DEE5C}" type="slidenum">
               <a:rPr lang="he-IL" smtClean="0"/>
+              <a:pPr/>
               <a:t>‹#›</a:t>
             </a:fld>
             <a:endParaRPr lang="he-IL"/>
@@ -4617,7 +4649,7 @@
     </p:spTree>
     <p:extLst>
       <p:ext uri="{BB962C8B-B14F-4D97-AF65-F5344CB8AC3E}">
-        <p14:creationId xmlns:p14="http://schemas.microsoft.com/office/powerpoint/2010/main" val="1112422893"/>
+        <p14:creationId xmlns:p14="http://schemas.microsoft.com/office/powerpoint/2010/main" xmlns="" val="1112422893"/>
       </p:ext>
     </p:extLst>
   </p:cSld>
@@ -5309,7 +5341,8 @@
           <a:p>
             <a:fld id="{7A2A5D9F-A28E-4F47-B87A-E515AA88734E}" type="datetimeFigureOut">
               <a:rPr lang="he-IL" smtClean="0"/>
-              <a:t>כ"ו/אדר/תשע"ח</a:t>
+              <a:pPr/>
+              <a:t>כ"ז/אדר/תשע"ח</a:t>
             </a:fld>
             <a:endParaRPr lang="he-IL"/>
           </a:p>
@@ -5385,6 +5418,7 @@
           <a:p>
             <a:fld id="{F30826BB-3476-4346-BDDB-A035EB3DEE5C}" type="slidenum">
               <a:rPr lang="he-IL" smtClean="0"/>
+              <a:pPr/>
               <a:t>‹#›</a:t>
             </a:fld>
             <a:endParaRPr lang="he-IL"/>
@@ -5394,7 +5428,7 @@
     </p:spTree>
     <p:extLst>
       <p:ext uri="{BB962C8B-B14F-4D97-AF65-F5344CB8AC3E}">
-        <p14:creationId xmlns:p14="http://schemas.microsoft.com/office/powerpoint/2010/main" val="575852176"/>
+        <p14:creationId xmlns:p14="http://schemas.microsoft.com/office/powerpoint/2010/main" xmlns="" val="575852176"/>
       </p:ext>
     </p:extLst>
   </p:cSld>
@@ -5900,7 +5934,7 @@
     </p:spTree>
     <p:extLst>
       <p:ext uri="{BB962C8B-B14F-4D97-AF65-F5344CB8AC3E}">
-        <p14:creationId xmlns:p14="http://schemas.microsoft.com/office/powerpoint/2010/main" val="1560563914"/>
+        <p14:creationId xmlns:p14="http://schemas.microsoft.com/office/powerpoint/2010/main" xmlns="" val="1560563914"/>
       </p:ext>
     </p:extLst>
   </p:cSld>
@@ -6007,10 +6041,10 @@
           <p:nvPr/>
         </p:nvPicPr>
         <p:blipFill>
-          <a:blip r:embed="rId2">
+          <a:blip r:embed="rId2" cstate="print">
             <a:extLst>
               <a:ext uri="{28A0092B-C50C-407E-A947-70E740481C1C}">
-                <a14:useLocalDpi xmlns:a14="http://schemas.microsoft.com/office/drawing/2010/main" val="0"/>
+                <a14:useLocalDpi xmlns:a14="http://schemas.microsoft.com/office/drawing/2010/main" xmlns="" val="0"/>
               </a:ext>
             </a:extLst>
           </a:blip>
@@ -6031,7 +6065,7 @@
     </p:spTree>
     <p:extLst>
       <p:ext uri="{BB962C8B-B14F-4D97-AF65-F5344CB8AC3E}">
-        <p14:creationId xmlns:p14="http://schemas.microsoft.com/office/powerpoint/2010/main" val="2884671587"/>
+        <p14:creationId xmlns:p14="http://schemas.microsoft.com/office/powerpoint/2010/main" xmlns="" val="2884671587"/>
       </p:ext>
     </p:extLst>
   </p:cSld>
@@ -6112,11 +6146,7 @@
             </a:r>
             <a:r>
               <a:rPr lang="he-IL" dirty="0" smtClean="0"/>
-              <a:t> – כדי ליצור את השרת ולהתחבר </a:t>
-            </a:r>
-            <a:r>
-              <a:rPr lang="he-IL" dirty="0" smtClean="0"/>
-              <a:t>ללקוח.</a:t>
+              <a:t> – כדי ליצור את השרת ולהתחבר ללקוח.</a:t>
             </a:r>
             <a:endParaRPr lang="en-US" dirty="0" smtClean="0"/>
           </a:p>
@@ -6133,11 +6163,7 @@
             </a:r>
             <a:r>
               <a:rPr lang="he-IL" dirty="0" smtClean="0"/>
-              <a:t>כדי להחזיר את מערכת  ההפעלה שהשרת רץ </a:t>
-            </a:r>
-            <a:r>
-              <a:rPr lang="he-IL" dirty="0" smtClean="0"/>
-              <a:t>עליה.</a:t>
+              <a:t>כדי להחזיר את מערכת  ההפעלה שהשרת רץ עליה.</a:t>
             </a:r>
             <a:endParaRPr lang="en-US" dirty="0" smtClean="0"/>
           </a:p>
@@ -6178,7 +6204,11 @@
             </a:r>
             <a:r>
               <a:rPr lang="en-US" dirty="0" smtClean="0"/>
-              <a:t>.PWD</a:t>
+              <a:t>PWD</a:t>
+            </a:r>
+            <a:r>
+              <a:rPr lang="he-IL" dirty="0" smtClean="0"/>
+              <a:t> וגם על מנת למחוק קבצים</a:t>
             </a:r>
             <a:endParaRPr lang="en-US" dirty="0" smtClean="0"/>
           </a:p>
@@ -6191,15 +6221,31 @@
               <a:rPr lang="en-US" dirty="0" smtClean="0">
                 <a:latin typeface="Algerian" panose="04020705040A02060702" pitchFamily="82" charset="0"/>
               </a:rPr>
-              <a:t>Database</a:t>
+              <a:t>Sqlite3</a:t>
             </a:r>
             <a:r>
               <a:rPr lang="he-IL" dirty="0" smtClean="0"/>
-              <a:t>כדי לשמור את המשתמשים </a:t>
+              <a:t>כדי </a:t>
             </a:r>
             <a:r>
               <a:rPr lang="he-IL" dirty="0" smtClean="0"/>
-              <a:t>והסיסמאות.</a:t>
+              <a:t>לשמור </a:t>
+            </a:r>
+            <a:r>
+              <a:rPr lang="he-IL" dirty="0" smtClean="0"/>
+              <a:t>מאגר</a:t>
+            </a:r>
+            <a:r>
+              <a:rPr lang="he-IL" dirty="0" smtClean="0"/>
+              <a:t> מידע</a:t>
+            </a:r>
+            <a:r>
+              <a:rPr lang="he-IL" dirty="0" smtClean="0"/>
+              <a:t> של משתמשים וסיסמאות</a:t>
+            </a:r>
+            <a:r>
+              <a:rPr lang="he-IL" dirty="0" smtClean="0"/>
+              <a:t>.</a:t>
             </a:r>
             <a:endParaRPr lang="en-US" dirty="0" smtClean="0"/>
           </a:p>
@@ -6216,7 +6262,15 @@
             </a:r>
             <a:r>
               <a:rPr lang="he-IL" dirty="0" smtClean="0"/>
-              <a:t> כדי ליצור את הפורט של </a:t>
+              <a:t> כדי </a:t>
+            </a:r>
+            <a:r>
+              <a:rPr lang="he-IL" dirty="0" smtClean="0"/>
+              <a:t>לעזור ביצירת הפורט </a:t>
+            </a:r>
+            <a:r>
+              <a:rPr lang="he-IL" dirty="0" smtClean="0"/>
+              <a:t>של </a:t>
             </a:r>
             <a:r>
               <a:rPr lang="he-IL" dirty="0" err="1" smtClean="0"/>
@@ -6282,9 +6336,6 @@
               </a:rPr>
               <a:t>- כדי לטפל בכמה לקוחות בו זמנית.</a:t>
             </a:r>
-            <a:endParaRPr lang="he-IL" dirty="0" smtClean="0">
-              <a:latin typeface="Algerian" panose="04020705040A02060702" pitchFamily="82" charset="0"/>
-            </a:endParaRPr>
           </a:p>
           <a:p>
             <a:r>
@@ -6338,7 +6389,7 @@
           <a:blip r:embed="rId2" cstate="print">
             <a:extLst>
               <a:ext uri="{28A0092B-C50C-407E-A947-70E740481C1C}">
-                <a14:useLocalDpi xmlns:a14="http://schemas.microsoft.com/office/drawing/2010/main" val="0"/>
+                <a14:useLocalDpi xmlns:a14="http://schemas.microsoft.com/office/drawing/2010/main" xmlns="" val="0"/>
               </a:ext>
             </a:extLst>
           </a:blip>
@@ -6358,7 +6409,7 @@
           <a:noFill/>
           <a:extLst>
             <a:ext uri="{909E8E84-426E-40DD-AFC4-6F175D3DCCD1}">
-              <a14:hiddenFill xmlns:a14="http://schemas.microsoft.com/office/drawing/2010/main">
+              <a14:hiddenFill xmlns:a14="http://schemas.microsoft.com/office/drawing/2010/main" xmlns="">
                 <a:solidFill>
                   <a:srgbClr val="FFFFFF"/>
                 </a:solidFill>
@@ -6370,7 +6421,7 @@
     </p:spTree>
     <p:extLst>
       <p:ext uri="{BB962C8B-B14F-4D97-AF65-F5344CB8AC3E}">
-        <p14:creationId xmlns:p14="http://schemas.microsoft.com/office/powerpoint/2010/main" val="3018848062"/>
+        <p14:creationId xmlns:p14="http://schemas.microsoft.com/office/powerpoint/2010/main" xmlns="" val="3018848062"/>
       </p:ext>
     </p:extLst>
   </p:cSld>
@@ -6463,15 +6514,7 @@
           <a:p>
             <a:r>
               <a:rPr lang="he-IL" dirty="0" smtClean="0"/>
-              <a:t>ליאור</a:t>
-            </a:r>
-            <a:r>
-              <a:rPr lang="he-IL" dirty="0" smtClean="0"/>
-              <a:t>: </a:t>
-            </a:r>
-            <a:r>
-              <a:rPr lang="he-IL" dirty="0" smtClean="0"/>
-              <a:t>במהלך טיפול בפקודת </a:t>
+              <a:t>ליאור: במהלך טיפול בפקודת </a:t>
             </a:r>
             <a:r>
               <a:rPr lang="en-US" dirty="0" smtClean="0"/>
@@ -6490,11 +6533,7 @@
             </a:br>
             <a:r>
               <a:rPr lang="he-IL" dirty="0" smtClean="0"/>
-              <a:t>דרך פתרון</a:t>
-            </a:r>
-            <a:r>
-              <a:rPr lang="he-IL" dirty="0" smtClean="0"/>
-              <a:t>: במקום לחכות ל</a:t>
+              <a:t>דרך פתרון: במקום לחכות ל</a:t>
             </a:r>
             <a:r>
               <a:rPr lang="en-US" dirty="0" smtClean="0"/>
@@ -6504,12 +6543,35 @@
               <a:rPr lang="he-IL" dirty="0" smtClean="0"/>
               <a:t> מלקוח כדי לסיים את ההעברה, יצרתי פעולה בוליאנית שבודקת אם חלק המידע שהתקבל ריק, והשתמשתי בה כדי לעצור את העברת הנתונים.</a:t>
             </a:r>
-            <a:endParaRPr lang="he-IL" dirty="0" smtClean="0"/>
           </a:p>
           <a:p>
             <a:r>
               <a:rPr lang="he-IL" dirty="0" smtClean="0"/>
-              <a:t>רון:</a:t>
+              <a:t>רון</a:t>
+            </a:r>
+            <a:r>
+              <a:rPr lang="he-IL" dirty="0" smtClean="0"/>
+              <a:t>: </a:t>
+            </a:r>
+            <a:r>
+              <a:rPr lang="he-IL" dirty="0" smtClean="0"/>
+              <a:t>ה</a:t>
+            </a:r>
+            <a:r>
+              <a:rPr lang="en-US" dirty="0" smtClean="0"/>
+              <a:t>client</a:t>
+            </a:r>
+            <a:r>
+              <a:rPr lang="he-IL" dirty="0" smtClean="0"/>
+              <a:t> שהשתמשנו בו כברירת מחדל השתמש בשני חיבורים לשרת,</a:t>
+            </a:r>
+            <a:r>
+              <a:rPr lang="en-US" dirty="0" smtClean="0"/>
+              <a:t> </a:t>
+            </a:r>
+            <a:r>
+              <a:rPr lang="he-IL" dirty="0" smtClean="0"/>
+              <a:t>דבר שהשרת שלנו לא תמך.</a:t>
             </a:r>
             <a:r>
               <a:rPr lang="en-US" dirty="0" smtClean="0"/>
@@ -6520,9 +6582,29 @@
             </a:br>
             <a:r>
               <a:rPr lang="he-IL" dirty="0" smtClean="0"/>
-              <a:t>דרך פתרון:</a:t>
-            </a:r>
-            <a:endParaRPr lang="he-IL" dirty="0"/>
+              <a:t>דרך פתרון</a:t>
+            </a:r>
+            <a:r>
+              <a:rPr lang="he-IL" dirty="0" smtClean="0"/>
+              <a:t>:</a:t>
+            </a:r>
+            <a:r>
+              <a:rPr lang="he-IL" dirty="0"/>
+              <a:t> </a:t>
+            </a:r>
+            <a:r>
+              <a:rPr lang="he-IL" dirty="0" smtClean="0"/>
+              <a:t>השתמשתי ב</a:t>
+            </a:r>
+            <a:r>
+              <a:rPr lang="en-US" dirty="0" smtClean="0"/>
+              <a:t>threading</a:t>
+            </a:r>
+            <a:r>
+              <a:rPr lang="he-IL" dirty="0" smtClean="0"/>
+              <a:t> כדי לשלוח כל משתמש שמתחבר לשרת ללולאה המטפלת בקבלת הבקשות, הפענוח שלהן(למחצה) והרצת הפקודה הנכונה לבקשה.</a:t>
+            </a:r>
+            <a:endParaRPr lang="he-IL" dirty="0" smtClean="0"/>
           </a:p>
         </p:txBody>
       </p:sp>
@@ -6535,10 +6617,10 @@
           <p:nvPr/>
         </p:nvPicPr>
         <p:blipFill>
-          <a:blip r:embed="rId2">
+          <a:blip r:embed="rId2" cstate="print">
             <a:extLst>
               <a:ext uri="{28A0092B-C50C-407E-A947-70E740481C1C}">
-                <a14:useLocalDpi xmlns:a14="http://schemas.microsoft.com/office/drawing/2010/main" val="0"/>
+                <a14:useLocalDpi xmlns:a14="http://schemas.microsoft.com/office/drawing/2010/main" xmlns="" val="0"/>
               </a:ext>
             </a:extLst>
           </a:blip>
@@ -6558,7 +6640,7 @@
           <a:noFill/>
           <a:extLst>
             <a:ext uri="{909E8E84-426E-40DD-AFC4-6F175D3DCCD1}">
-              <a14:hiddenFill xmlns:a14="http://schemas.microsoft.com/office/drawing/2010/main">
+              <a14:hiddenFill xmlns:a14="http://schemas.microsoft.com/office/drawing/2010/main" xmlns="">
                 <a:solidFill>
                   <a:srgbClr val="FFFFFF"/>
                 </a:solidFill>
@@ -6570,7 +6652,7 @@
     </p:spTree>
     <p:extLst>
       <p:ext uri="{BB962C8B-B14F-4D97-AF65-F5344CB8AC3E}">
-        <p14:creationId xmlns:p14="http://schemas.microsoft.com/office/powerpoint/2010/main" val="3038478454"/>
+        <p14:creationId xmlns:p14="http://schemas.microsoft.com/office/powerpoint/2010/main" xmlns="" val="3038478454"/>
       </p:ext>
     </p:extLst>
   </p:cSld>
@@ -6693,7 +6775,7 @@
     </p:spTree>
     <p:extLst>
       <p:ext uri="{BB962C8B-B14F-4D97-AF65-F5344CB8AC3E}">
-        <p14:creationId xmlns:p14="http://schemas.microsoft.com/office/powerpoint/2010/main" val="206214532"/>
+        <p14:creationId xmlns:p14="http://schemas.microsoft.com/office/powerpoint/2010/main" xmlns="" val="206214532"/>
       </p:ext>
     </p:extLst>
   </p:cSld>
@@ -6746,7 +6828,7 @@
     </a:clrScheme>
     <a:fontScheme name="פיאה">
       <a:majorFont>
-        <a:latin typeface="Trebuchet MS" panose="020B0603020202020204"/>
+        <a:latin typeface="Trebuchet MS"/>
         <a:ea typeface=""/>
         <a:cs typeface=""/>
         <a:font script="Jpan" typeface="メイリオ"/>
@@ -6781,7 +6863,7 @@
         <a:font script="Geor" typeface="Sylfaen"/>
       </a:majorFont>
       <a:minorFont>
-        <a:latin typeface="Trebuchet MS" panose="020B0603020202020204"/>
+        <a:latin typeface="Trebuchet MS"/>
         <a:ea typeface=""/>
         <a:cs typeface=""/>
         <a:font script="Jpan" typeface="メイリオ"/>
@@ -6954,7 +7036,7 @@
   <a:extraClrSchemeLst/>
   <a:extLst>
     <a:ext uri="{05A4C25C-085E-4340-85A3-A5531E510DB2}">
-      <thm15:themeFamily xmlns:thm15="http://schemas.microsoft.com/office/thememl/2012/main" name="Facet" id="{C0C680CD-088A-49FC-A102-D699147F32B2}" vid="{CFBC31BA-B70F-4F30-BCAA-4F3011E16C4D}"/>
+      <thm15:themeFamily xmlns:thm15="http://schemas.microsoft.com/office/thememl/2012/main" xmlns="" name="Facet" id="{C0C680CD-088A-49FC-A102-D699147F32B2}" vid="{CFBC31BA-B70F-4F30-BCAA-4F3011E16C4D}"/>
     </a:ext>
   </a:extLst>
 </a:theme>

</xml_diff>